<commit_message>
COMP270: Week 5 material, plus some fixes to week 4
</commit_message>
<xml_diff>
--- a/COMP270/04/2020-21-COMP270-04-lecture-materials-4.pptx
+++ b/COMP270/04/2020-21-COMP270-04-lecture-materials-4.pptx
@@ -219,7 +219,7 @@
           <a:p>
             <a:fld id="{DE762F5C-A615-4DA8-8C6E-87A0A08BA6E3}" type="datetimeFigureOut">
               <a:rPr lang="en-GB" smtClean="0"/>
-              <a:t>03/10/2020</a:t>
+              <a:t>13/10/2020</a:t>
             </a:fld>
             <a:endParaRPr lang="en-GB"/>
           </a:p>
@@ -533,7 +533,7 @@
           <a:p>
             <a:r>
               <a:rPr lang="en-GB" dirty="0"/>
-              <a:t>Congratulations – you’ve made it through the calculus and the definitions to the final part of this week’s lecture, which is where things really get interesting, </a:t>
+              <a:t>In the past three videos we’ve essentially been setting the scene, introducing calculus as a method for analysing quantities that change over time and looking at how it can be applied to physical behaviours, deriving a set of equations relating the quantities of displacement, velocity and acceleration over time.</a:t>
             </a:r>
           </a:p>
         </p:txBody>
@@ -866,7 +866,7 @@
           <a:p>
             <a:r>
               <a:rPr lang="en-GB" dirty="0"/>
-              <a:t>As we’re going to take the equations that we derived in the previous video and rearrange them a little more, to see what information they can give us about the way that objects move through geometric space and discover some general results about that motion. This will also reveal how we can apply the equations to solve problems where we need to find certain of the values given others, for example to determine the initial settings to achieve a desired outcome.</a:t>
+              <a:t>We’re now going to play around with these equations, to see what information they can give us about the way that objects move through geometric space and discover some general results about that motion. This will also reveal how we can apply the equations to solve problems where we need to find certain of the values given others, for example to determine the initial settings to achieve a desired outcome.</a:t>
             </a:r>
           </a:p>
         </p:txBody>
@@ -1049,7 +1049,7 @@
           <a:p>
             <a:r>
               <a:rPr lang="en-GB" dirty="0"/>
-              <a:t>Which are any objects that have been projected by some mechanism that causes it to continue in motion with no further forces being applied, which means that the acceleration remains constant. Normally, it’s only gravity that is considered, but you might model certain other forces, such as wind, as a constant acceleration for simplicity, although that’s not strictly accurate in a physical sense. Projectiles can include</a:t>
+              <a:t>Which are any objects that have been projected by some mechanism that causes them to continue in motion with no further forces being applied, which means that the acceleration remains constant. Normally, it’s only gravity that is considered, but you might model certain other forces, such as wind, as a constant acceleration for simplicity, although that’s not strictly accurate in a physical sense. Projectiles can include</a:t>
             </a:r>
           </a:p>
           <a:p>
@@ -1129,7 +1129,7 @@
             </a:r>
             <a:r>
               <a:rPr lang="en-GB" dirty="0"/>
-              <a:t> equation. If we</a:t>
+              <a:t> equation. Note that s is the displacement, which is the vector from the origin or starting position to the current position, rather than the total distance travelled. If we</a:t>
             </a:r>
           </a:p>
           <a:p>
@@ -1542,7 +1542,7 @@
           <a:p>
             <a:r>
               <a:rPr lang="en-GB" dirty="0"/>
-              <a:t>[…]. I should point out that you don’t need to memorise this result, or even look it up as a separate formula, as you’d generally work it out from the original equations using the actual numerical quantities; I’m only generating these results to illustrate how you can manipulate the equations to find different values. Note that we can adapt this particular expression for situations where the projectile will land at a different height from where it started by </a:t>
+              <a:t>[…]. I should point out that you probably won’t find this result as a standard formula; I’m just generating these expressions to illustrate how you can manipulate the equations to find different values. Note that we can adapt this particular expression for situations where the projectile will land at a different height from where it started by </a:t>
             </a:r>
           </a:p>
           <a:p>
@@ -1830,7 +1830,7 @@
           <a:p>
             <a:r>
               <a:rPr lang="en-GB" dirty="0"/>
-              <a:t>[…] horizontally. One of the conditions for projectile motion is that gravity is the only force, which means that there is no horizonal acceleration, </a:t>
+              <a:t>[…] horizontally. Since we’re assuming that gravity is the only force, which means that there is no horizonal acceleration, </a:t>
             </a:r>
           </a:p>
           <a:p>
@@ -1839,7 +1839,7 @@
           <a:p>
             <a:r>
               <a:rPr lang="en-GB" dirty="0"/>
-              <a:t>So if we substitute our values in here, we get</a:t>
+              <a:t>if we substitute our values in here, we get</a:t>
             </a:r>
           </a:p>
           <a:p>
@@ -1857,7 +1857,7 @@
           <a:p>
             <a:r>
               <a:rPr lang="en-GB" dirty="0"/>
-              <a:t>To the much neater […]. We can also work out the maximum range for a given speed by noting that the highest value that the sin function will return is 1, which is when</a:t>
+              <a:t>To the much neater […]. We can also work out the maximum range for a given speed by setting the numerator of the fraction to be its highest value,</a:t>
             </a:r>
           </a:p>
           <a:p>
@@ -1866,7 +1866,7 @@
           <a:p>
             <a:r>
               <a:rPr lang="en-GB" dirty="0"/>
-              <a:t>the range expression will also be at its maximum; this happens when 2-theta 90 degrees, and so theta is 45 degrees.</a:t>
+              <a:t>which occurs when sin 2theta is 1, meaning 2theta would be 90 and theta would be 45.</a:t>
             </a:r>
           </a:p>
         </p:txBody>
@@ -2137,7 +2137,7 @@
             <a:fld id="{B61BEF0D-F0BB-DE4B-95CE-6DB70DBA9567}" type="datetimeFigureOut">
               <a:rPr lang="en-US" smtClean="0"/>
               <a:pPr/>
-              <a:t>10/3/2020</a:t>
+              <a:t>10/13/2020</a:t>
             </a:fld>
             <a:endParaRPr lang="en-US" dirty="0"/>
           </a:p>
@@ -2473,7 +2473,7 @@
             <a:fld id="{B61BEF0D-F0BB-DE4B-95CE-6DB70DBA9567}" type="datetimeFigureOut">
               <a:rPr lang="en-US" smtClean="0"/>
               <a:pPr/>
-              <a:t>10/3/2020</a:t>
+              <a:t>10/13/2020</a:t>
             </a:fld>
             <a:endParaRPr lang="en-US" dirty="0"/>
           </a:p>
@@ -2753,7 +2753,7 @@
             <a:fld id="{B61BEF0D-F0BB-DE4B-95CE-6DB70DBA9567}" type="datetimeFigureOut">
               <a:rPr lang="en-US" smtClean="0"/>
               <a:pPr/>
-              <a:t>10/3/2020</a:t>
+              <a:t>10/13/2020</a:t>
             </a:fld>
             <a:endParaRPr lang="en-US" dirty="0"/>
           </a:p>
@@ -3323,7 +3323,7 @@
             <a:fld id="{B61BEF0D-F0BB-DE4B-95CE-6DB70DBA9567}" type="datetimeFigureOut">
               <a:rPr lang="en-US" smtClean="0"/>
               <a:pPr/>
-              <a:t>10/3/2020</a:t>
+              <a:t>10/13/2020</a:t>
             </a:fld>
             <a:endParaRPr lang="en-US" dirty="0"/>
           </a:p>
@@ -3603,7 +3603,7 @@
             <a:fld id="{B61BEF0D-F0BB-DE4B-95CE-6DB70DBA9567}" type="datetimeFigureOut">
               <a:rPr lang="en-US" smtClean="0"/>
               <a:pPr/>
-              <a:t>10/3/2020</a:t>
+              <a:t>10/13/2020</a:t>
             </a:fld>
             <a:endParaRPr lang="en-US" dirty="0"/>
           </a:p>
@@ -4167,7 +4167,7 @@
             <a:fld id="{B61BEF0D-F0BB-DE4B-95CE-6DB70DBA9567}" type="datetimeFigureOut">
               <a:rPr lang="en-US" smtClean="0"/>
               <a:pPr/>
-              <a:t>10/3/2020</a:t>
+              <a:t>10/13/2020</a:t>
             </a:fld>
             <a:endParaRPr lang="en-US" dirty="0"/>
           </a:p>
@@ -4496,7 +4496,7 @@
             <a:fld id="{B61BEF0D-F0BB-DE4B-95CE-6DB70DBA9567}" type="datetimeFigureOut">
               <a:rPr lang="en-US" smtClean="0"/>
               <a:pPr/>
-              <a:t>10/3/2020</a:t>
+              <a:t>10/13/2020</a:t>
             </a:fld>
             <a:endParaRPr lang="en-US" dirty="0"/>
           </a:p>
@@ -4675,7 +4675,7 @@
             <a:fld id="{B61BEF0D-F0BB-DE4B-95CE-6DB70DBA9567}" type="datetimeFigureOut">
               <a:rPr lang="en-US" smtClean="0"/>
               <a:pPr/>
-              <a:t>10/3/2020</a:t>
+              <a:t>10/13/2020</a:t>
             </a:fld>
             <a:endParaRPr lang="en-US" dirty="0"/>
           </a:p>
@@ -4915,7 +4915,7 @@
             <a:fld id="{B61BEF0D-F0BB-DE4B-95CE-6DB70DBA9567}" type="datetimeFigureOut">
               <a:rPr lang="en-US" smtClean="0"/>
               <a:pPr/>
-              <a:t>10/3/2020</a:t>
+              <a:t>10/13/2020</a:t>
             </a:fld>
             <a:endParaRPr lang="en-US" dirty="0"/>
           </a:p>
@@ -5164,7 +5164,7 @@
             <a:fld id="{B61BEF0D-F0BB-DE4B-95CE-6DB70DBA9567}" type="datetimeFigureOut">
               <a:rPr lang="en-US" smtClean="0"/>
               <a:pPr/>
-              <a:t>10/3/2020</a:t>
+              <a:t>10/13/2020</a:t>
             </a:fld>
             <a:endParaRPr lang="en-US" dirty="0"/>
           </a:p>
@@ -5442,7 +5442,7 @@
             <a:fld id="{B61BEF0D-F0BB-DE4B-95CE-6DB70DBA9567}" type="datetimeFigureOut">
               <a:rPr lang="en-US" smtClean="0"/>
               <a:pPr/>
-              <a:t>10/3/2020</a:t>
+              <a:t>10/13/2020</a:t>
             </a:fld>
             <a:endParaRPr lang="en-US" dirty="0"/>
           </a:p>
@@ -5710,7 +5710,7 @@
             <a:fld id="{B61BEF0D-F0BB-DE4B-95CE-6DB70DBA9567}" type="datetimeFigureOut">
               <a:rPr lang="en-US" smtClean="0"/>
               <a:pPr/>
-              <a:t>10/3/2020</a:t>
+              <a:t>10/13/2020</a:t>
             </a:fld>
             <a:endParaRPr lang="en-US" dirty="0"/>
           </a:p>
@@ -6086,7 +6086,7 @@
             <a:fld id="{B61BEF0D-F0BB-DE4B-95CE-6DB70DBA9567}" type="datetimeFigureOut">
               <a:rPr lang="en-US" smtClean="0"/>
               <a:pPr/>
-              <a:t>10/3/2020</a:t>
+              <a:t>10/13/2020</a:t>
             </a:fld>
             <a:endParaRPr lang="en-US" dirty="0"/>
           </a:p>
@@ -6236,7 +6236,7 @@
             <a:fld id="{B61BEF0D-F0BB-DE4B-95CE-6DB70DBA9567}" type="datetimeFigureOut">
               <a:rPr lang="en-US" smtClean="0"/>
               <a:pPr/>
-              <a:t>10/3/2020</a:t>
+              <a:t>10/13/2020</a:t>
             </a:fld>
             <a:endParaRPr lang="en-US" dirty="0"/>
           </a:p>
@@ -6363,7 +6363,7 @@
             <a:fld id="{B61BEF0D-F0BB-DE4B-95CE-6DB70DBA9567}" type="datetimeFigureOut">
               <a:rPr lang="en-US" smtClean="0"/>
               <a:pPr/>
-              <a:t>10/3/2020</a:t>
+              <a:t>10/13/2020</a:t>
             </a:fld>
             <a:endParaRPr lang="en-US" dirty="0"/>
           </a:p>
@@ -6650,7 +6650,7 @@
             <a:fld id="{B61BEF0D-F0BB-DE4B-95CE-6DB70DBA9567}" type="datetimeFigureOut">
               <a:rPr lang="en-US" smtClean="0"/>
               <a:pPr/>
-              <a:t>10/3/2020</a:t>
+              <a:t>10/13/2020</a:t>
             </a:fld>
             <a:endParaRPr lang="en-US" dirty="0"/>
           </a:p>
@@ -6976,7 +6976,7 @@
             <a:fld id="{B61BEF0D-F0BB-DE4B-95CE-6DB70DBA9567}" type="datetimeFigureOut">
               <a:rPr lang="en-US" smtClean="0"/>
               <a:pPr/>
-              <a:t>10/3/2020</a:t>
+              <a:t>10/13/2020</a:t>
             </a:fld>
             <a:endParaRPr lang="en-US" dirty="0"/>
           </a:p>
@@ -7190,7 +7190,7 @@
             <a:fld id="{B61BEF0D-F0BB-DE4B-95CE-6DB70DBA9567}" type="datetimeFigureOut">
               <a:rPr lang="en-US" smtClean="0"/>
               <a:pPr/>
-              <a:t>10/3/2020</a:t>
+              <a:t>10/13/2020</a:t>
             </a:fld>
             <a:endParaRPr lang="en-US" dirty="0"/>
           </a:p>

</xml_diff>